<commit_message>
Add codebook to Assignment 2
</commit_message>
<xml_diff>
--- a/Lecture08_OtherNonlinearModels/Lecture8_NonlinearModels_2022F.pptx
+++ b/Lecture08_OtherNonlinearModels/Lecture8_NonlinearModels_2022F.pptx
@@ -280,7 +280,7 @@
           <a:p>
             <a:fld id="{EF911157-0FC2-4F06-8D61-FD647FE4E19D}" type="datetimeFigureOut">
               <a:rPr lang="en-US" smtClean="0"/>
-              <a:t>11/1/2022</a:t>
+              <a:t>11/4/2022</a:t>
             </a:fld>
             <a:endParaRPr lang="en-US"/>
           </a:p>
@@ -7192,7 +7192,7 @@
             <a:fld id="{0972D05C-DCFB-4BB6-B49C-AC126BF3ED2C}" type="datetimeFigureOut">
               <a:rPr lang="en-US" smtClean="0"/>
               <a:pPr/>
-              <a:t>11/1/2022</a:t>
+              <a:t>11/4/2022</a:t>
             </a:fld>
             <a:endParaRPr lang="en-US"/>
           </a:p>
@@ -7422,7 +7422,7 @@
             <a:fld id="{0972D05C-DCFB-4BB6-B49C-AC126BF3ED2C}" type="datetimeFigureOut">
               <a:rPr lang="en-US" smtClean="0"/>
               <a:pPr/>
-              <a:t>11/1/2022</a:t>
+              <a:t>11/4/2022</a:t>
             </a:fld>
             <a:endParaRPr lang="en-US"/>
           </a:p>
@@ -7604,7 +7604,7 @@
             <a:fld id="{0972D05C-DCFB-4BB6-B49C-AC126BF3ED2C}" type="datetimeFigureOut">
               <a:rPr lang="en-US" smtClean="0"/>
               <a:pPr/>
-              <a:t>11/1/2022</a:t>
+              <a:t>11/4/2022</a:t>
             </a:fld>
             <a:endParaRPr lang="en-US"/>
           </a:p>
@@ -7776,7 +7776,7 @@
             <a:fld id="{0972D05C-DCFB-4BB6-B49C-AC126BF3ED2C}" type="datetimeFigureOut">
               <a:rPr lang="en-US" smtClean="0"/>
               <a:pPr/>
-              <a:t>11/1/2022</a:t>
+              <a:t>11/4/2022</a:t>
             </a:fld>
             <a:endParaRPr lang="en-US"/>
           </a:p>
@@ -8032,7 +8032,7 @@
             <a:fld id="{0972D05C-DCFB-4BB6-B49C-AC126BF3ED2C}" type="datetimeFigureOut">
               <a:rPr lang="en-US" smtClean="0"/>
               <a:pPr/>
-              <a:t>11/1/2022</a:t>
+              <a:t>11/4/2022</a:t>
             </a:fld>
             <a:endParaRPr lang="en-US"/>
           </a:p>
@@ -8360,7 +8360,7 @@
             <a:fld id="{0972D05C-DCFB-4BB6-B49C-AC126BF3ED2C}" type="datetimeFigureOut">
               <a:rPr lang="en-US" smtClean="0"/>
               <a:pPr/>
-              <a:t>11/1/2022</a:t>
+              <a:t>11/4/2022</a:t>
             </a:fld>
             <a:endParaRPr lang="en-US"/>
           </a:p>
@@ -8813,7 +8813,7 @@
             <a:fld id="{0972D05C-DCFB-4BB6-B49C-AC126BF3ED2C}" type="datetimeFigureOut">
               <a:rPr lang="en-US" smtClean="0"/>
               <a:pPr/>
-              <a:t>11/1/2022</a:t>
+              <a:t>11/4/2022</a:t>
             </a:fld>
             <a:endParaRPr lang="en-US"/>
           </a:p>
@@ -8933,7 +8933,7 @@
             <a:fld id="{0972D05C-DCFB-4BB6-B49C-AC126BF3ED2C}" type="datetimeFigureOut">
               <a:rPr lang="en-US" smtClean="0"/>
               <a:pPr/>
-              <a:t>11/1/2022</a:t>
+              <a:t>11/4/2022</a:t>
             </a:fld>
             <a:endParaRPr lang="en-US"/>
           </a:p>
@@ -9030,7 +9030,7 @@
             <a:fld id="{0972D05C-DCFB-4BB6-B49C-AC126BF3ED2C}" type="datetimeFigureOut">
               <a:rPr lang="en-US" smtClean="0"/>
               <a:pPr/>
-              <a:t>11/1/2022</a:t>
+              <a:t>11/4/2022</a:t>
             </a:fld>
             <a:endParaRPr lang="en-US"/>
           </a:p>
@@ -9319,7 +9319,7 @@
             <a:fld id="{0972D05C-DCFB-4BB6-B49C-AC126BF3ED2C}" type="datetimeFigureOut">
               <a:rPr lang="en-US" smtClean="0"/>
               <a:pPr/>
-              <a:t>11/1/2022</a:t>
+              <a:t>11/4/2022</a:t>
             </a:fld>
             <a:endParaRPr lang="en-US"/>
           </a:p>
@@ -9643,7 +9643,7 @@
             <a:fld id="{0972D05C-DCFB-4BB6-B49C-AC126BF3ED2C}" type="datetimeFigureOut">
               <a:rPr lang="en-US" smtClean="0"/>
               <a:pPr/>
-              <a:t>11/1/2022</a:t>
+              <a:t>11/4/2022</a:t>
             </a:fld>
             <a:endParaRPr lang="en-US"/>
           </a:p>
@@ -9898,7 +9898,7 @@
             <a:fld id="{0972D05C-DCFB-4BB6-B49C-AC126BF3ED2C}" type="datetimeFigureOut">
               <a:rPr lang="en-US" smtClean="0"/>
               <a:pPr/>
-              <a:t>11/1/2022</a:t>
+              <a:t>11/4/2022</a:t>
             </a:fld>
             <a:endParaRPr lang="en-US" dirty="0"/>
           </a:p>
@@ -11768,8 +11768,8 @@
           </a:p>
         </p:txBody>
       </p:sp>
-      <mc:AlternateContent xmlns:mc="http://schemas.openxmlformats.org/markup-compatibility/2006" xmlns:a14="http://schemas.microsoft.com/office/drawing/2010/main">
-        <mc:Choice Requires="a14">
+      <mc:AlternateContent xmlns:mc="http://schemas.openxmlformats.org/markup-compatibility/2006">
+        <mc:Choice xmlns:a14="http://schemas.microsoft.com/office/drawing/2010/main" Requires="a14">
           <p:sp>
             <p:nvSpPr>
               <p:cNvPr id="3" name="Content Placeholder 2"/>
@@ -12886,7 +12886,14 @@
                             <a:latin typeface="Cambria Math" panose="02040503050406030204" pitchFamily="18" charset="0"/>
                             <a:cs typeface="Times New Roman" panose="02020603050405020304" pitchFamily="18" charset="0"/>
                           </a:rPr>
-                          <m:t>−1&lt;1</m:t>
+                          <m:t>−1&lt;</m:t>
+                        </m:r>
+                        <m:r>
+                          <a:rPr lang="en-US" sz="2400" b="0" i="1" smtClean="0">
+                            <a:latin typeface="Cambria Math" panose="02040503050406030204" pitchFamily="18" charset="0"/>
+                            <a:cs typeface="Times New Roman" panose="02020603050405020304" pitchFamily="18" charset="0"/>
+                          </a:rPr>
+                          <m:t>0</m:t>
                         </m:r>
                       </m:e>
                     </m:func>
@@ -13011,7 +13018,7 @@
                   <a:rPr lang="en-US" sz="2400" dirty="0">
                     <a:cs typeface="Times New Roman" panose="02020603050405020304" pitchFamily="18" charset="0"/>
                   </a:rPr>
-                  <a:t> &gt; 1, then </a:t>
+                  <a:t> &gt; 0, then </a:t>
                 </a:r>
                 <a14:m>
                   <m:oMath xmlns:m="http://schemas.openxmlformats.org/officeDocument/2006/math">
@@ -13083,7 +13090,7 @@
             </p:txBody>
           </p:sp>
         </mc:Choice>
-        <mc:Fallback xmlns="">
+        <mc:Fallback>
           <p:sp>
             <p:nvSpPr>
               <p:cNvPr id="3" name="Content Placeholder 2"/>
@@ -13111,7 +13118,7 @@
               <a:lstStyle/>
               <a:p>
                 <a:r>
-                  <a:rPr lang="en-CA">
+                  <a:rPr lang="en-US">
                     <a:noFill/>
                   </a:rPr>
                   <a:t> </a:t>
@@ -24856,8 +24863,8 @@
           </a:p>
         </p:txBody>
       </p:sp>
-      <mc:AlternateContent xmlns:mc="http://schemas.openxmlformats.org/markup-compatibility/2006">
-        <mc:Choice xmlns:a14="http://schemas.microsoft.com/office/drawing/2010/main" Requires="a14">
+      <mc:AlternateContent xmlns:mc="http://schemas.openxmlformats.org/markup-compatibility/2006" xmlns:a14="http://schemas.microsoft.com/office/drawing/2010/main">
+        <mc:Choice Requires="a14">
           <p:sp>
             <p:nvSpPr>
               <p:cNvPr id="3" name="Content Placeholder 2"/>
@@ -25094,7 +25101,7 @@
             </p:txBody>
           </p:sp>
         </mc:Choice>
-        <mc:Fallback>
+        <mc:Fallback xmlns="">
           <p:sp>
             <p:nvSpPr>
               <p:cNvPr id="3" name="Content Placeholder 2"/>
@@ -27209,8 +27216,8 @@
           </a:p>
         </p:txBody>
       </p:sp>
-      <mc:AlternateContent xmlns:mc="http://schemas.openxmlformats.org/markup-compatibility/2006">
-        <mc:Choice xmlns:a14="http://schemas.microsoft.com/office/drawing/2010/main" Requires="a14">
+      <mc:AlternateContent xmlns:mc="http://schemas.openxmlformats.org/markup-compatibility/2006" xmlns:a14="http://schemas.microsoft.com/office/drawing/2010/main">
+        <mc:Choice Requires="a14">
           <p:sp>
             <p:nvSpPr>
               <p:cNvPr id="3" name="Content Placeholder 2"/>
@@ -27854,7 +27861,7 @@
             </p:txBody>
           </p:sp>
         </mc:Choice>
-        <mc:Fallback>
+        <mc:Fallback xmlns="">
           <p:sp>
             <p:nvSpPr>
               <p:cNvPr id="3" name="Content Placeholder 2"/>
@@ -28122,8 +28129,8 @@
           </a:p>
         </p:txBody>
       </p:sp>
-      <mc:AlternateContent xmlns:mc="http://schemas.openxmlformats.org/markup-compatibility/2006">
-        <mc:Choice xmlns:a14="http://schemas.microsoft.com/office/drawing/2010/main" Requires="a14">
+      <mc:AlternateContent xmlns:mc="http://schemas.openxmlformats.org/markup-compatibility/2006" xmlns:a14="http://schemas.microsoft.com/office/drawing/2010/main">
+        <mc:Choice Requires="a14">
           <p:sp>
             <p:nvSpPr>
               <p:cNvPr id="3" name="Content Placeholder 2"/>
@@ -28874,7 +28881,7 @@
             </p:txBody>
           </p:sp>
         </mc:Choice>
-        <mc:Fallback>
+        <mc:Fallback xmlns="">
           <p:sp>
             <p:nvSpPr>
               <p:cNvPr id="3" name="Content Placeholder 2"/>
@@ -29637,8 +29644,8 @@
           </a:p>
         </p:txBody>
       </p:sp>
-      <mc:AlternateContent xmlns:mc="http://schemas.openxmlformats.org/markup-compatibility/2006">
-        <mc:Choice xmlns:a14="http://schemas.microsoft.com/office/drawing/2010/main" Requires="a14">
+      <mc:AlternateContent xmlns:mc="http://schemas.openxmlformats.org/markup-compatibility/2006" xmlns:a14="http://schemas.microsoft.com/office/drawing/2010/main">
+        <mc:Choice Requires="a14">
           <p:sp>
             <p:nvSpPr>
               <p:cNvPr id="3" name="Content Placeholder 2"/>
@@ -29984,7 +29991,7 @@
             </p:txBody>
           </p:sp>
         </mc:Choice>
-        <mc:Fallback>
+        <mc:Fallback xmlns="">
           <p:sp>
             <p:nvSpPr>
               <p:cNvPr id="3" name="Content Placeholder 2"/>

</xml_diff>